<commit_message>
#5 udate component diagram sign_in_sign_up
</commit_message>
<xml_diff>
--- a/docs/CM-Sign-in_Sign-up.pptx
+++ b/docs/CM-Sign-in_Sign-up.pptx
@@ -261,7 +261,7 @@
           <a:p>
             <a:fld id="{82C41053-9735-4359-AC24-64E074D90158}" type="datetimeFigureOut">
               <a:rPr lang="en-US" smtClean="0"/>
-              <a:t>11/28/2021</a:t>
+              <a:t>11/29/2021</a:t>
             </a:fld>
             <a:endParaRPr lang="en-US"/>
           </a:p>
@@ -459,7 +459,7 @@
           <a:p>
             <a:fld id="{82C41053-9735-4359-AC24-64E074D90158}" type="datetimeFigureOut">
               <a:rPr lang="en-US" smtClean="0"/>
-              <a:t>11/28/2021</a:t>
+              <a:t>11/29/2021</a:t>
             </a:fld>
             <a:endParaRPr lang="en-US"/>
           </a:p>
@@ -667,7 +667,7 @@
           <a:p>
             <a:fld id="{82C41053-9735-4359-AC24-64E074D90158}" type="datetimeFigureOut">
               <a:rPr lang="en-US" smtClean="0"/>
-              <a:t>11/28/2021</a:t>
+              <a:t>11/29/2021</a:t>
             </a:fld>
             <a:endParaRPr lang="en-US"/>
           </a:p>
@@ -865,7 +865,7 @@
           <a:p>
             <a:fld id="{82C41053-9735-4359-AC24-64E074D90158}" type="datetimeFigureOut">
               <a:rPr lang="en-US" smtClean="0"/>
-              <a:t>11/28/2021</a:t>
+              <a:t>11/29/2021</a:t>
             </a:fld>
             <a:endParaRPr lang="en-US"/>
           </a:p>
@@ -1140,7 +1140,7 @@
           <a:p>
             <a:fld id="{82C41053-9735-4359-AC24-64E074D90158}" type="datetimeFigureOut">
               <a:rPr lang="en-US" smtClean="0"/>
-              <a:t>11/28/2021</a:t>
+              <a:t>11/29/2021</a:t>
             </a:fld>
             <a:endParaRPr lang="en-US"/>
           </a:p>
@@ -1405,7 +1405,7 @@
           <a:p>
             <a:fld id="{82C41053-9735-4359-AC24-64E074D90158}" type="datetimeFigureOut">
               <a:rPr lang="en-US" smtClean="0"/>
-              <a:t>11/28/2021</a:t>
+              <a:t>11/29/2021</a:t>
             </a:fld>
             <a:endParaRPr lang="en-US"/>
           </a:p>
@@ -1817,7 +1817,7 @@
           <a:p>
             <a:fld id="{82C41053-9735-4359-AC24-64E074D90158}" type="datetimeFigureOut">
               <a:rPr lang="en-US" smtClean="0"/>
-              <a:t>11/28/2021</a:t>
+              <a:t>11/29/2021</a:t>
             </a:fld>
             <a:endParaRPr lang="en-US"/>
           </a:p>
@@ -1958,7 +1958,7 @@
           <a:p>
             <a:fld id="{82C41053-9735-4359-AC24-64E074D90158}" type="datetimeFigureOut">
               <a:rPr lang="en-US" smtClean="0"/>
-              <a:t>11/28/2021</a:t>
+              <a:t>11/29/2021</a:t>
             </a:fld>
             <a:endParaRPr lang="en-US"/>
           </a:p>
@@ -2071,7 +2071,7 @@
           <a:p>
             <a:fld id="{82C41053-9735-4359-AC24-64E074D90158}" type="datetimeFigureOut">
               <a:rPr lang="en-US" smtClean="0"/>
-              <a:t>11/28/2021</a:t>
+              <a:t>11/29/2021</a:t>
             </a:fld>
             <a:endParaRPr lang="en-US"/>
           </a:p>
@@ -2382,7 +2382,7 @@
           <a:p>
             <a:fld id="{82C41053-9735-4359-AC24-64E074D90158}" type="datetimeFigureOut">
               <a:rPr lang="en-US" smtClean="0"/>
-              <a:t>11/28/2021</a:t>
+              <a:t>11/29/2021</a:t>
             </a:fld>
             <a:endParaRPr lang="en-US"/>
           </a:p>
@@ -2670,7 +2670,7 @@
           <a:p>
             <a:fld id="{82C41053-9735-4359-AC24-64E074D90158}" type="datetimeFigureOut">
               <a:rPr lang="en-US" smtClean="0"/>
-              <a:t>11/28/2021</a:t>
+              <a:t>11/29/2021</a:t>
             </a:fld>
             <a:endParaRPr lang="en-US"/>
           </a:p>
@@ -2911,7 +2911,7 @@
           <a:p>
             <a:fld id="{82C41053-9735-4359-AC24-64E074D90158}" type="datetimeFigureOut">
               <a:rPr lang="en-US" smtClean="0"/>
-              <a:t>11/28/2021</a:t>
+              <a:t>11/29/2021</a:t>
             </a:fld>
             <a:endParaRPr lang="en-US"/>
           </a:p>
@@ -3658,36 +3658,6 @@
           </a:p>
         </p:txBody>
       </p:sp>
-      <p:pic>
-        <p:nvPicPr>
-          <p:cNvPr id="7" name="Picture 6">
-            <a:extLst>
-              <a:ext uri="{FF2B5EF4-FFF2-40B4-BE49-F238E27FC236}">
-                <a16:creationId xmlns:a16="http://schemas.microsoft.com/office/drawing/2014/main" id="{81AACC93-299A-40B6-892D-FE31A2B74453}"/>
-              </a:ext>
-            </a:extLst>
-          </p:cNvPr>
-          <p:cNvPicPr>
-            <a:picLocks noChangeAspect="1"/>
-          </p:cNvPicPr>
-          <p:nvPr/>
-        </p:nvPicPr>
-        <p:blipFill>
-          <a:blip r:embed="rId2"/>
-          <a:stretch>
-            <a:fillRect/>
-          </a:stretch>
-        </p:blipFill>
-        <p:spPr>
-          <a:xfrm>
-            <a:off x="7487422" y="1484247"/>
-            <a:ext cx="4663634" cy="4231541"/>
-          </a:xfrm>
-          <a:prstGeom prst="rect">
-            <a:avLst/>
-          </a:prstGeom>
-        </p:spPr>
-      </p:pic>
       <p:sp>
         <p:nvSpPr>
           <p:cNvPr id="8" name="TextBox 7">
@@ -4138,8 +4108,8 @@
         </p:nvSpPr>
         <p:spPr>
           <a:xfrm>
-            <a:off x="442145" y="4393710"/>
-            <a:ext cx="4314825" cy="1200329"/>
+            <a:off x="531402" y="4492015"/>
+            <a:ext cx="4314825" cy="923330"/>
           </a:xfrm>
           <a:prstGeom prst="rect">
             <a:avLst/>
@@ -4151,16 +4121,6 @@
             <a:spAutoFit/>
           </a:bodyPr>
           <a:lstStyle/>
-          <a:p>
-            <a:r>
-              <a:rPr lang="" altLang="en-US" b="1" dirty="0">
-                <a:solidFill>
-                  <a:srgbClr val="FF0000"/>
-                </a:solidFill>
-              </a:rPr>
-              <a:t>- Phone number is nullable</a:t>
-            </a:r>
-          </a:p>
           <a:p>
             <a:r>
               <a:rPr lang="" altLang="en-US" b="1" dirty="0">
@@ -4255,36 +4215,36 @@
           </a:p>
         </p:txBody>
       </p:sp>
-      <p:sp>
-        <p:nvSpPr>
-          <p:cNvPr id="2" name="TextBox 1"/>
-          <p:cNvSpPr txBox="1"/>
+      <p:pic>
+        <p:nvPicPr>
+          <p:cNvPr id="3" name="Picture 2">
+            <a:extLst>
+              <a:ext uri="{FF2B5EF4-FFF2-40B4-BE49-F238E27FC236}">
+                <a16:creationId xmlns:a16="http://schemas.microsoft.com/office/drawing/2014/main" id="{8F39FF4C-4FB9-47D5-8AAB-25C7EDAA37C7}"/>
+              </a:ext>
+            </a:extLst>
+          </p:cNvPr>
+          <p:cNvPicPr>
+            <a:picLocks noChangeAspect="1"/>
+          </p:cNvPicPr>
           <p:nvPr/>
-        </p:nvSpPr>
-        <p:spPr>
-          <a:xfrm>
-            <a:off x="2466711" y="3629055"/>
-            <a:ext cx="1154479" cy="338554"/>
+        </p:nvPicPr>
+        <p:blipFill>
+          <a:blip r:embed="rId2"/>
+          <a:stretch>
+            <a:fillRect/>
+          </a:stretch>
+        </p:blipFill>
+        <p:spPr>
+          <a:xfrm>
+            <a:off x="7769331" y="1795950"/>
+            <a:ext cx="4115201" cy="3760558"/>
           </a:xfrm>
           <a:prstGeom prst="rect">
             <a:avLst/>
           </a:prstGeom>
-          <a:noFill/>
-        </p:spPr>
-        <p:txBody>
-          <a:bodyPr wrap="square" rtlCol="0">
-            <a:spAutoFit/>
-          </a:bodyPr>
-          <a:lstStyle/>
-          <a:p>
-            <a:r>
-              <a:rPr lang="en-US" sz="1600" dirty="0" smtClean="0"/>
-              <a:t>Adduser</a:t>
-            </a:r>
-            <a:endParaRPr lang="en-US" dirty="0"/>
-          </a:p>
-        </p:txBody>
-      </p:sp>
+        </p:spPr>
+      </p:pic>
     </p:spTree>
     <p:extLst>
       <p:ext uri="{BB962C8B-B14F-4D97-AF65-F5344CB8AC3E}">
@@ -4315,35 +4275,6 @@
           <a:chExt cx="0" cy="0"/>
         </a:xfrm>
       </p:grpSpPr>
-      <p:pic>
-        <p:nvPicPr>
-          <p:cNvPr id="6" name="Picture 5">
-            <a:extLst>
-              <a:ext uri="{FF2B5EF4-FFF2-40B4-BE49-F238E27FC236}">
-                <a16:creationId xmlns:a16="http://schemas.microsoft.com/office/drawing/2014/main" id="{AA0CDE68-A60E-4765-926D-EF95EEDCA9DC}"/>
-              </a:ext>
-            </a:extLst>
-          </p:cNvPr>
-          <p:cNvPicPr>
-            <a:picLocks noChangeAspect="1"/>
-          </p:cNvPicPr>
-          <p:nvPr/>
-        </p:nvPicPr>
-        <p:blipFill rotWithShape="1">
-          <a:blip r:embed="rId2"/>
-          <a:srcRect l="7558" t="5559" r="7324" b="6800"/>
-          <a:stretch/>
-        </p:blipFill>
-        <p:spPr>
-          <a:xfrm>
-            <a:off x="7455461" y="1463521"/>
-            <a:ext cx="4736539" cy="4178304"/>
-          </a:xfrm>
-          <a:prstGeom prst="rect">
-            <a:avLst/>
-          </a:prstGeom>
-        </p:spPr>
-      </p:pic>
       <p:sp>
         <p:nvSpPr>
           <p:cNvPr id="7" name="TextBox 6">
@@ -4833,8 +4764,8 @@
         </p:nvSpPr>
         <p:spPr>
           <a:xfrm>
-            <a:off x="425218" y="4377094"/>
-            <a:ext cx="5107312" cy="1200329"/>
+            <a:off x="458230" y="4459348"/>
+            <a:ext cx="5107312" cy="923330"/>
           </a:xfrm>
           <a:prstGeom prst="rect">
             <a:avLst/>
@@ -4846,16 +4777,6 @@
             <a:spAutoFit/>
           </a:bodyPr>
           <a:lstStyle/>
-          <a:p>
-            <a:r>
-              <a:rPr lang="" altLang="en-US" b="1" dirty="0">
-                <a:solidFill>
-                  <a:srgbClr val="FF0000"/>
-                </a:solidFill>
-              </a:rPr>
-              <a:t>- We don’t check the username</a:t>
-            </a:r>
-          </a:p>
           <a:p>
             <a:r>
               <a:rPr lang="" altLang="en-US" b="1" dirty="0">
@@ -4950,36 +4871,36 @@
           </a:p>
         </p:txBody>
       </p:sp>
-      <p:sp>
-        <p:nvSpPr>
-          <p:cNvPr id="3" name="TextBox 2"/>
-          <p:cNvSpPr txBox="1"/>
+      <p:pic>
+        <p:nvPicPr>
+          <p:cNvPr id="3" name="Picture 2">
+            <a:extLst>
+              <a:ext uri="{FF2B5EF4-FFF2-40B4-BE49-F238E27FC236}">
+                <a16:creationId xmlns:a16="http://schemas.microsoft.com/office/drawing/2014/main" id="{0A46F2EF-096D-4884-89F6-D319B538B033}"/>
+              </a:ext>
+            </a:extLst>
+          </p:cNvPr>
+          <p:cNvPicPr>
+            <a:picLocks noChangeAspect="1"/>
+          </p:cNvPicPr>
           <p:nvPr/>
-        </p:nvSpPr>
-        <p:spPr>
-          <a:xfrm>
-            <a:off x="2546374" y="3613666"/>
-            <a:ext cx="835168" cy="369332"/>
+        </p:nvPicPr>
+        <p:blipFill>
+          <a:blip r:embed="rId2"/>
+          <a:stretch>
+            <a:fillRect/>
+          </a:stretch>
+        </p:blipFill>
+        <p:spPr>
+          <a:xfrm>
+            <a:off x="7638197" y="1608760"/>
+            <a:ext cx="4500971" cy="4085833"/>
           </a:xfrm>
           <a:prstGeom prst="rect">
             <a:avLst/>
           </a:prstGeom>
-          <a:noFill/>
-        </p:spPr>
-        <p:txBody>
-          <a:bodyPr wrap="square" rtlCol="0">
-            <a:spAutoFit/>
-          </a:bodyPr>
-          <a:lstStyle/>
-          <a:p>
-            <a:r>
-              <a:rPr lang="en-US" dirty="0" smtClean="0"/>
-              <a:t>Sign-in</a:t>
-            </a:r>
-            <a:endParaRPr lang="en-US" dirty="0"/>
-          </a:p>
-        </p:txBody>
-      </p:sp>
+        </p:spPr>
+      </p:pic>
     </p:spTree>
     <p:extLst>
       <p:ext uri="{BB962C8B-B14F-4D97-AF65-F5344CB8AC3E}">

</xml_diff>